<commit_message>
Added CSS styling to resemble mockup
</commit_message>
<xml_diff>
--- a/assets/mockups/wd1.pptx
+++ b/assets/mockups/wd1.pptx
@@ -105,6 +105,11 @@
       </a:defRPr>
     </a:lvl9pPr>
   </p:defaultTextStyle>
+  <p:extLst>
+    <p:ext uri="{EFAFB233-063F-42B5-8137-9DF3F51BA10A}">
+      <p15:sldGuideLst xmlns:p15="http://schemas.microsoft.com/office/powerpoint/2012/main"/>
+    </p:ext>
+  </p:extLst>
 </p:presentation>
 </file>
 
@@ -406,10 +411,13 @@
                         </a:solidFill>
                       </a:rPr>
                       <a:pPr>
-                        <a:defRPr sz="1200">
+                        <a:defRPr sz="1200" b="0" i="0" u="none" strike="noStrike" kern="1200" baseline="0">
                           <a:solidFill>
                             <a:schemeClr val="bg1"/>
                           </a:solidFill>
+                          <a:latin typeface="+mn-lt"/>
+                          <a:ea typeface="+mn-ea"/>
+                          <a:cs typeface="+mn-cs"/>
                         </a:defRPr>
                       </a:pPr>
                       <a:t>[VALUE]</a:t>
@@ -425,25 +433,6 @@
                 </a:ln>
                 <a:effectLst/>
               </c:spPr>
-              <c:txPr>
-                <a:bodyPr rot="0" spcFirstLastPara="1" vertOverflow="ellipsis" vert="horz" wrap="none" lIns="0" tIns="0" rIns="0" bIns="0" anchor="t" anchorCtr="0">
-                  <a:noAutofit/>
-                </a:bodyPr>
-                <a:lstStyle/>
-                <a:p>
-                  <a:pPr>
-                    <a:defRPr sz="1200" b="0" i="0" u="none" strike="noStrike" kern="1200" baseline="0">
-                      <a:solidFill>
-                        <a:schemeClr val="bg1"/>
-                      </a:solidFill>
-                      <a:latin typeface="+mn-lt"/>
-                      <a:ea typeface="+mn-ea"/>
-                      <a:cs typeface="+mn-cs"/>
-                    </a:defRPr>
-                  </a:pPr>
-                  <a:endParaRPr lang="en-US"/>
-                </a:p>
-              </c:txPr>
               <c:showLegendKey val="0"/>
               <c:showVal val="1"/>
               <c:showCatName val="0"/>
@@ -456,10 +445,6 @@
                     <a:prstGeom prst="rect">
                       <a:avLst/>
                     </a:prstGeom>
-                    <a:noFill/>
-                    <a:ln>
-                      <a:noFill/>
-                    </a:ln>
                   </c15:spPr>
                   <c15:layout>
                     <c:manualLayout>
@@ -521,10 +506,6 @@
                     <a:prstGeom prst="rect">
                       <a:avLst/>
                     </a:prstGeom>
-                    <a:noFill/>
-                    <a:ln>
-                      <a:noFill/>
-                    </a:ln>
                   </c15:spPr>
                   <c15:layout>
                     <c:manualLayout>
@@ -836,10 +817,6 @@
                   <a:prstGeom prst="rect">
                     <a:avLst/>
                   </a:prstGeom>
-                  <a:noFill/>
-                  <a:ln>
-                    <a:noFill/>
-                  </a:ln>
                 </c15:spPr>
                 <c15:showLeaderLines val="0"/>
               </c:ext>
@@ -1113,575 +1090,10 @@
       <a:endParaRPr lang="en-US"/>
     </a:p>
   </c:txPr>
-  <c:externalData r:id="rId3">
+  <c:externalData r:id="rId1">
     <c:autoUpdate val="0"/>
   </c:externalData>
 </c:chartSpace>
-</file>
-
-<file path=ppt/charts/colors1.xml><?xml version="1.0" encoding="utf-8"?>
-<cs:colorStyle xmlns:cs="http://schemas.microsoft.com/office/drawing/2012/chartStyle" xmlns:a="http://schemas.openxmlformats.org/drawingml/2006/main" meth="cycle" id="10">
-  <a:schemeClr val="accent1"/>
-  <a:schemeClr val="accent2"/>
-  <a:schemeClr val="accent3"/>
-  <a:schemeClr val="accent4"/>
-  <a:schemeClr val="accent5"/>
-  <a:schemeClr val="accent6"/>
-  <cs:variation/>
-  <cs:variation>
-    <a:lumMod val="60000"/>
-  </cs:variation>
-  <cs:variation>
-    <a:lumMod val="80000"/>
-    <a:lumOff val="20000"/>
-  </cs:variation>
-  <cs:variation>
-    <a:lumMod val="80000"/>
-  </cs:variation>
-  <cs:variation>
-    <a:lumMod val="60000"/>
-    <a:lumOff val="40000"/>
-  </cs:variation>
-  <cs:variation>
-    <a:lumMod val="50000"/>
-  </cs:variation>
-  <cs:variation>
-    <a:lumMod val="70000"/>
-    <a:lumOff val="30000"/>
-  </cs:variation>
-  <cs:variation>
-    <a:lumMod val="70000"/>
-  </cs:variation>
-  <cs:variation>
-    <a:lumMod val="50000"/>
-    <a:lumOff val="50000"/>
-  </cs:variation>
-</cs:colorStyle>
-</file>
-
-<file path=ppt/charts/style1.xml><?xml version="1.0" encoding="utf-8"?>
-<cs:chartStyle xmlns:cs="http://schemas.microsoft.com/office/drawing/2012/chartStyle" xmlns:a="http://schemas.openxmlformats.org/drawingml/2006/main" id="280">
-  <cs:axisTitle>
-    <cs:lnRef idx="0"/>
-    <cs:fillRef idx="0"/>
-    <cs:effectRef idx="0"/>
-    <cs:fontRef idx="minor">
-      <a:schemeClr val="tx1">
-        <a:lumMod val="50000"/>
-        <a:lumOff val="50000"/>
-      </a:schemeClr>
-    </cs:fontRef>
-    <cs:defRPr sz="1197" kern="1200" cap="all"/>
-  </cs:axisTitle>
-  <cs:categoryAxis>
-    <cs:lnRef idx="0"/>
-    <cs:fillRef idx="0"/>
-    <cs:effectRef idx="0"/>
-    <cs:fontRef idx="minor">
-      <a:schemeClr val="tx1">
-        <a:lumMod val="50000"/>
-        <a:lumOff val="50000"/>
-      </a:schemeClr>
-    </cs:fontRef>
-    <cs:spPr>
-      <a:ln w="9525" cap="flat" cmpd="sng" algn="ctr">
-        <a:solidFill>
-          <a:schemeClr val="tx1">
-            <a:lumMod val="15000"/>
-            <a:lumOff val="85000"/>
-          </a:schemeClr>
-        </a:solidFill>
-        <a:round/>
-      </a:ln>
-    </cs:spPr>
-    <cs:defRPr sz="1197" kern="1200"/>
-  </cs:categoryAxis>
-  <cs:chartArea mods="allowNoFillOverride allowNoLineOverride">
-    <cs:lnRef idx="0"/>
-    <cs:fillRef idx="0"/>
-    <cs:effectRef idx="0"/>
-    <cs:fontRef idx="minor">
-      <a:schemeClr val="dk1"/>
-    </cs:fontRef>
-    <cs:spPr>
-      <a:solidFill>
-        <a:schemeClr val="bg1"/>
-      </a:solidFill>
-      <a:ln w="9525" cap="flat" cmpd="sng" algn="ctr">
-        <a:solidFill>
-          <a:schemeClr val="tx1">
-            <a:lumMod val="15000"/>
-            <a:lumOff val="85000"/>
-          </a:schemeClr>
-        </a:solidFill>
-        <a:round/>
-      </a:ln>
-    </cs:spPr>
-    <cs:defRPr sz="1197" kern="1200"/>
-  </cs:chartArea>
-  <cs:dataLabel>
-    <cs:lnRef idx="0"/>
-    <cs:fillRef idx="0"/>
-    <cs:effectRef idx="0"/>
-    <cs:fontRef idx="minor">
-      <a:schemeClr val="tx1">
-        <a:lumMod val="50000"/>
-        <a:lumOff val="50000"/>
-      </a:schemeClr>
-    </cs:fontRef>
-    <cs:defRPr sz="1197" kern="1200"/>
-  </cs:dataLabel>
-  <cs:dataLabelCallout>
-    <cs:lnRef idx="0"/>
-    <cs:fillRef idx="0"/>
-    <cs:effectRef idx="0"/>
-    <cs:fontRef idx="minor">
-      <a:schemeClr val="dk1">
-        <a:lumMod val="65000"/>
-        <a:lumOff val="35000"/>
-      </a:schemeClr>
-    </cs:fontRef>
-    <cs:spPr>
-      <a:solidFill>
-        <a:schemeClr val="lt1"/>
-      </a:solidFill>
-      <a:ln>
-        <a:solidFill>
-          <a:schemeClr val="dk1">
-            <a:lumMod val="25000"/>
-            <a:lumOff val="75000"/>
-          </a:schemeClr>
-        </a:solidFill>
-      </a:ln>
-    </cs:spPr>
-    <cs:defRPr sz="1197" kern="1200"/>
-    <cs:bodyPr rot="0" spcFirstLastPara="1" vertOverflow="clip" horzOverflow="clip" vert="horz" wrap="square" lIns="36576" tIns="18288" rIns="36576" bIns="18288" anchor="ctr" anchorCtr="1">
-      <a:spAutoFit/>
-    </cs:bodyPr>
-  </cs:dataLabelCallout>
-  <cs:dataPoint>
-    <cs:lnRef idx="0">
-      <cs:styleClr val="auto"/>
-    </cs:lnRef>
-    <cs:fillRef idx="2">
-      <cs:styleClr val="auto"/>
-    </cs:fillRef>
-    <cs:effectRef idx="1"/>
-    <cs:fontRef idx="minor">
-      <a:schemeClr val="dk1"/>
-    </cs:fontRef>
-    <cs:spPr>
-      <a:ln w="9525" cap="flat" cmpd="sng" algn="ctr">
-        <a:solidFill>
-          <a:schemeClr val="phClr">
-            <a:shade val="95000"/>
-          </a:schemeClr>
-        </a:solidFill>
-        <a:round/>
-      </a:ln>
-    </cs:spPr>
-  </cs:dataPoint>
-  <cs:dataPoint3D>
-    <cs:lnRef idx="0">
-      <cs:styleClr val="auto"/>
-    </cs:lnRef>
-    <cs:fillRef idx="2">
-      <cs:styleClr val="auto"/>
-    </cs:fillRef>
-    <cs:effectRef idx="1"/>
-    <cs:fontRef idx="minor">
-      <a:schemeClr val="dk1"/>
-    </cs:fontRef>
-    <cs:spPr>
-      <a:ln w="9525" cap="flat" cmpd="sng" algn="ctr">
-        <a:solidFill>
-          <a:schemeClr val="phClr">
-            <a:shade val="95000"/>
-          </a:schemeClr>
-        </a:solidFill>
-        <a:round/>
-      </a:ln>
-    </cs:spPr>
-  </cs:dataPoint3D>
-  <cs:dataPointLine>
-    <cs:lnRef idx="0">
-      <cs:styleClr val="auto"/>
-    </cs:lnRef>
-    <cs:fillRef idx="2">
-      <cs:styleClr val="auto"/>
-    </cs:fillRef>
-    <cs:effectRef idx="1"/>
-    <cs:fontRef idx="minor">
-      <a:schemeClr val="dk1"/>
-    </cs:fontRef>
-    <cs:spPr>
-      <a:ln w="15875" cap="rnd">
-        <a:solidFill>
-          <a:schemeClr val="phClr"/>
-        </a:solidFill>
-        <a:round/>
-      </a:ln>
-    </cs:spPr>
-  </cs:dataPointLine>
-  <cs:dataPointMarker>
-    <cs:lnRef idx="0">
-      <cs:styleClr val="auto"/>
-    </cs:lnRef>
-    <cs:fillRef idx="2">
-      <cs:styleClr val="auto"/>
-    </cs:fillRef>
-    <cs:effectRef idx="1"/>
-    <cs:fontRef idx="minor">
-      <a:schemeClr val="dk1"/>
-    </cs:fontRef>
-    <cs:spPr>
-      <a:ln w="9525" cap="flat" cmpd="sng" algn="ctr">
-        <a:solidFill>
-          <a:schemeClr val="phClr">
-            <a:shade val="95000"/>
-          </a:schemeClr>
-        </a:solidFill>
-        <a:round/>
-      </a:ln>
-    </cs:spPr>
-  </cs:dataPointMarker>
-  <cs:dataPointMarkerLayout symbol="circle" size="4"/>
-  <cs:dataPointWireframe>
-    <cs:lnRef idx="0">
-      <cs:styleClr val="auto"/>
-    </cs:lnRef>
-    <cs:fillRef idx="2"/>
-    <cs:effectRef idx="0"/>
-    <cs:fontRef idx="minor">
-      <a:schemeClr val="dk1"/>
-    </cs:fontRef>
-    <cs:spPr>
-      <a:ln w="9525" cap="rnd">
-        <a:solidFill>
-          <a:schemeClr val="phClr"/>
-        </a:solidFill>
-        <a:round/>
-      </a:ln>
-    </cs:spPr>
-  </cs:dataPointWireframe>
-  <cs:dataTable>
-    <cs:lnRef idx="0"/>
-    <cs:fillRef idx="0"/>
-    <cs:effectRef idx="0"/>
-    <cs:fontRef idx="minor">
-      <a:schemeClr val="tx1">
-        <a:lumMod val="50000"/>
-        <a:lumOff val="50000"/>
-      </a:schemeClr>
-    </cs:fontRef>
-    <cs:spPr>
-      <a:ln w="9525">
-        <a:solidFill>
-          <a:schemeClr val="tx1">
-            <a:lumMod val="15000"/>
-            <a:lumOff val="85000"/>
-          </a:schemeClr>
-        </a:solidFill>
-      </a:ln>
-    </cs:spPr>
-    <cs:defRPr sz="1197" kern="1200"/>
-  </cs:dataTable>
-  <cs:downBar>
-    <cs:lnRef idx="0"/>
-    <cs:fillRef idx="0"/>
-    <cs:effectRef idx="0"/>
-    <cs:fontRef idx="minor">
-      <a:schemeClr val="dk1"/>
-    </cs:fontRef>
-    <cs:spPr>
-      <a:solidFill>
-        <a:schemeClr val="dk1">
-          <a:lumMod val="75000"/>
-          <a:lumOff val="25000"/>
-        </a:schemeClr>
-      </a:solidFill>
-      <a:ln w="9525">
-        <a:solidFill>
-          <a:schemeClr val="tx1">
-            <a:lumMod val="50000"/>
-            <a:lumOff val="50000"/>
-          </a:schemeClr>
-        </a:solidFill>
-      </a:ln>
-    </cs:spPr>
-  </cs:downBar>
-  <cs:dropLine>
-    <cs:lnRef idx="0"/>
-    <cs:fillRef idx="0"/>
-    <cs:effectRef idx="0"/>
-    <cs:fontRef idx="minor">
-      <a:schemeClr val="dk1"/>
-    </cs:fontRef>
-    <cs:spPr>
-      <a:ln w="9525">
-        <a:solidFill>
-          <a:schemeClr val="tx1">
-            <a:lumMod val="35000"/>
-            <a:lumOff val="65000"/>
-          </a:schemeClr>
-        </a:solidFill>
-        <a:prstDash val="dash"/>
-      </a:ln>
-    </cs:spPr>
-  </cs:dropLine>
-  <cs:errorBar>
-    <cs:lnRef idx="0"/>
-    <cs:fillRef idx="0"/>
-    <cs:effectRef idx="0"/>
-    <cs:fontRef idx="minor">
-      <a:schemeClr val="dk1"/>
-    </cs:fontRef>
-    <cs:spPr>
-      <a:ln w="9525">
-        <a:solidFill>
-          <a:schemeClr val="tx1">
-            <a:lumMod val="50000"/>
-            <a:lumOff val="50000"/>
-          </a:schemeClr>
-        </a:solidFill>
-      </a:ln>
-    </cs:spPr>
-  </cs:errorBar>
-  <cs:floor>
-    <cs:lnRef idx="0"/>
-    <cs:fillRef idx="0"/>
-    <cs:effectRef idx="0"/>
-    <cs:fontRef idx="minor">
-      <a:schemeClr val="dk1"/>
-    </cs:fontRef>
-  </cs:floor>
-  <cs:gridlineMajor>
-    <cs:lnRef idx="0"/>
-    <cs:fillRef idx="0"/>
-    <cs:effectRef idx="0"/>
-    <cs:fontRef idx="minor">
-      <a:schemeClr val="dk1"/>
-    </cs:fontRef>
-    <cs:spPr>
-      <a:ln w="9525" cap="flat" cmpd="sng" algn="ctr">
-        <a:solidFill>
-          <a:schemeClr val="tx1">
-            <a:lumMod val="15000"/>
-            <a:lumOff val="85000"/>
-          </a:schemeClr>
-        </a:solidFill>
-        <a:round/>
-      </a:ln>
-    </cs:spPr>
-  </cs:gridlineMajor>
-  <cs:gridlineMinor>
-    <cs:lnRef idx="0"/>
-    <cs:fillRef idx="0"/>
-    <cs:effectRef idx="0"/>
-    <cs:fontRef idx="minor">
-      <a:schemeClr val="dk1"/>
-    </cs:fontRef>
-    <cs:spPr>
-      <a:ln>
-        <a:solidFill>
-          <a:schemeClr val="tx1">
-            <a:lumMod val="5000"/>
-            <a:lumOff val="95000"/>
-          </a:schemeClr>
-        </a:solidFill>
-      </a:ln>
-    </cs:spPr>
-  </cs:gridlineMinor>
-  <cs:hiLoLine>
-    <cs:lnRef idx="0"/>
-    <cs:fillRef idx="0"/>
-    <cs:effectRef idx="0"/>
-    <cs:fontRef idx="minor">
-      <a:schemeClr val="dk1"/>
-    </cs:fontRef>
-    <cs:spPr>
-      <a:ln w="9525">
-        <a:solidFill>
-          <a:schemeClr val="tx1">
-            <a:lumMod val="50000"/>
-            <a:lumOff val="50000"/>
-          </a:schemeClr>
-        </a:solidFill>
-        <a:prstDash val="dash"/>
-      </a:ln>
-    </cs:spPr>
-  </cs:hiLoLine>
-  <cs:leaderLine>
-    <cs:lnRef idx="0"/>
-    <cs:fillRef idx="0"/>
-    <cs:effectRef idx="0"/>
-    <cs:fontRef idx="minor">
-      <a:schemeClr val="dk1"/>
-    </cs:fontRef>
-    <cs:spPr>
-      <a:ln w="9525">
-        <a:solidFill>
-          <a:schemeClr val="tx1">
-            <a:lumMod val="35000"/>
-            <a:lumOff val="65000"/>
-          </a:schemeClr>
-        </a:solidFill>
-      </a:ln>
-    </cs:spPr>
-  </cs:leaderLine>
-  <cs:legend>
-    <cs:lnRef idx="0"/>
-    <cs:fillRef idx="0"/>
-    <cs:effectRef idx="0"/>
-    <cs:fontRef idx="minor">
-      <a:schemeClr val="tx1">
-        <a:lumMod val="50000"/>
-        <a:lumOff val="50000"/>
-      </a:schemeClr>
-    </cs:fontRef>
-    <cs:defRPr sz="1197" kern="1200"/>
-  </cs:legend>
-  <cs:plotArea mods="allowNoFillOverride allowNoLineOverride">
-    <cs:lnRef idx="0"/>
-    <cs:fillRef idx="0"/>
-    <cs:effectRef idx="0"/>
-    <cs:fontRef idx="minor">
-      <a:schemeClr val="dk1"/>
-    </cs:fontRef>
-  </cs:plotArea>
-  <cs:plotArea3D mods="allowNoFillOverride allowNoLineOverride">
-    <cs:lnRef idx="0"/>
-    <cs:fillRef idx="0"/>
-    <cs:effectRef idx="0"/>
-    <cs:fontRef idx="minor">
-      <a:schemeClr val="dk1"/>
-    </cs:fontRef>
-  </cs:plotArea3D>
-  <cs:seriesAxis>
-    <cs:lnRef idx="0"/>
-    <cs:fillRef idx="0"/>
-    <cs:effectRef idx="0"/>
-    <cs:fontRef idx="minor">
-      <a:schemeClr val="tx1">
-        <a:lumMod val="50000"/>
-        <a:lumOff val="50000"/>
-      </a:schemeClr>
-    </cs:fontRef>
-    <cs:spPr>
-      <a:ln w="9525" cap="flat" cmpd="sng" algn="ctr">
-        <a:solidFill>
-          <a:schemeClr val="tx1">
-            <a:lumMod val="15000"/>
-            <a:lumOff val="85000"/>
-          </a:schemeClr>
-        </a:solidFill>
-        <a:round/>
-      </a:ln>
-    </cs:spPr>
-    <cs:defRPr sz="1197" kern="1200"/>
-  </cs:seriesAxis>
-  <cs:seriesLine>
-    <cs:lnRef idx="0"/>
-    <cs:fillRef idx="0"/>
-    <cs:effectRef idx="0"/>
-    <cs:fontRef idx="minor">
-      <a:schemeClr val="dk1"/>
-    </cs:fontRef>
-    <cs:spPr>
-      <a:ln w="9525">
-        <a:solidFill>
-          <a:schemeClr val="tx1">
-            <a:lumMod val="35000"/>
-            <a:lumOff val="65000"/>
-          </a:schemeClr>
-        </a:solidFill>
-        <a:prstDash val="dash"/>
-      </a:ln>
-    </cs:spPr>
-  </cs:seriesLine>
-  <cs:title>
-    <cs:lnRef idx="0"/>
-    <cs:fillRef idx="0"/>
-    <cs:effectRef idx="0"/>
-    <cs:fontRef idx="minor">
-      <a:schemeClr val="tx1">
-        <a:lumMod val="50000"/>
-        <a:lumOff val="50000"/>
-      </a:schemeClr>
-    </cs:fontRef>
-    <cs:defRPr sz="1862" kern="1200" cap="none" spc="20" baseline="0"/>
-  </cs:title>
-  <cs:trendline>
-    <cs:lnRef idx="0">
-      <cs:styleClr val="auto"/>
-    </cs:lnRef>
-    <cs:fillRef idx="2"/>
-    <cs:effectRef idx="0"/>
-    <cs:fontRef idx="minor">
-      <a:schemeClr val="dk1"/>
-    </cs:fontRef>
-    <cs:spPr>
-      <a:ln w="9525" cap="rnd">
-        <a:solidFill>
-          <a:schemeClr val="phClr"/>
-        </a:solidFill>
-      </a:ln>
-    </cs:spPr>
-  </cs:trendline>
-  <cs:trendlineLabel>
-    <cs:lnRef idx="0"/>
-    <cs:fillRef idx="0"/>
-    <cs:effectRef idx="0"/>
-    <cs:fontRef idx="minor">
-      <a:schemeClr val="tx1">
-        <a:lumMod val="50000"/>
-        <a:lumOff val="50000"/>
-      </a:schemeClr>
-    </cs:fontRef>
-    <cs:defRPr sz="1197" kern="1200"/>
-  </cs:trendlineLabel>
-  <cs:upBar>
-    <cs:lnRef idx="0"/>
-    <cs:fillRef idx="0"/>
-    <cs:effectRef idx="0"/>
-    <cs:fontRef idx="minor">
-      <a:schemeClr val="dk1"/>
-    </cs:fontRef>
-    <cs:spPr>
-      <a:solidFill>
-        <a:schemeClr val="lt1"/>
-      </a:solidFill>
-      <a:ln w="9525">
-        <a:solidFill>
-          <a:schemeClr val="tx1">
-            <a:lumMod val="50000"/>
-            <a:lumOff val="50000"/>
-          </a:schemeClr>
-        </a:solidFill>
-      </a:ln>
-    </cs:spPr>
-  </cs:upBar>
-  <cs:valueAxis>
-    <cs:lnRef idx="0"/>
-    <cs:fillRef idx="0"/>
-    <cs:effectRef idx="0"/>
-    <cs:fontRef idx="minor">
-      <a:schemeClr val="tx1">
-        <a:lumMod val="50000"/>
-        <a:lumOff val="50000"/>
-      </a:schemeClr>
-    </cs:fontRef>
-    <cs:defRPr sz="1197" kern="1200"/>
-  </cs:valueAxis>
-  <cs:wall>
-    <cs:lnRef idx="0"/>
-    <cs:fillRef idx="0"/>
-    <cs:effectRef idx="0"/>
-    <cs:fontRef idx="minor">
-      <a:schemeClr val="dk1"/>
-    </cs:fontRef>
-  </cs:wall>
-</cs:chartStyle>
 </file>
 
 <file path=ppt/slideLayouts/slideLayout1.xml><?xml version="1.0" encoding="utf-8"?>
@@ -1833,7 +1245,7 @@
           <a:p>
             <a:fld id="{17E757C0-C851-46AB-BED4-C081D4977DEA}" type="datetimeFigureOut">
               <a:rPr lang="en-AU" smtClean="0"/>
-              <a:t>26/03/2022</a:t>
+              <a:t>27/03/2022</a:t>
             </a:fld>
             <a:endParaRPr lang="en-AU"/>
           </a:p>
@@ -2033,7 +1445,7 @@
           <a:p>
             <a:fld id="{17E757C0-C851-46AB-BED4-C081D4977DEA}" type="datetimeFigureOut">
               <a:rPr lang="en-AU" smtClean="0"/>
-              <a:t>26/03/2022</a:t>
+              <a:t>27/03/2022</a:t>
             </a:fld>
             <a:endParaRPr lang="en-AU"/>
           </a:p>
@@ -2243,7 +1655,7 @@
           <a:p>
             <a:fld id="{17E757C0-C851-46AB-BED4-C081D4977DEA}" type="datetimeFigureOut">
               <a:rPr lang="en-AU" smtClean="0"/>
-              <a:t>26/03/2022</a:t>
+              <a:t>27/03/2022</a:t>
             </a:fld>
             <a:endParaRPr lang="en-AU"/>
           </a:p>
@@ -2443,7 +1855,7 @@
           <a:p>
             <a:fld id="{17E757C0-C851-46AB-BED4-C081D4977DEA}" type="datetimeFigureOut">
               <a:rPr lang="en-AU" smtClean="0"/>
-              <a:t>26/03/2022</a:t>
+              <a:t>27/03/2022</a:t>
             </a:fld>
             <a:endParaRPr lang="en-AU"/>
           </a:p>
@@ -2719,7 +2131,7 @@
           <a:p>
             <a:fld id="{17E757C0-C851-46AB-BED4-C081D4977DEA}" type="datetimeFigureOut">
               <a:rPr lang="en-AU" smtClean="0"/>
-              <a:t>26/03/2022</a:t>
+              <a:t>27/03/2022</a:t>
             </a:fld>
             <a:endParaRPr lang="en-AU"/>
           </a:p>
@@ -2987,7 +2399,7 @@
           <a:p>
             <a:fld id="{17E757C0-C851-46AB-BED4-C081D4977DEA}" type="datetimeFigureOut">
               <a:rPr lang="en-AU" smtClean="0"/>
-              <a:t>26/03/2022</a:t>
+              <a:t>27/03/2022</a:t>
             </a:fld>
             <a:endParaRPr lang="en-AU"/>
           </a:p>
@@ -3402,7 +2814,7 @@
           <a:p>
             <a:fld id="{17E757C0-C851-46AB-BED4-C081D4977DEA}" type="datetimeFigureOut">
               <a:rPr lang="en-AU" smtClean="0"/>
-              <a:t>26/03/2022</a:t>
+              <a:t>27/03/2022</a:t>
             </a:fld>
             <a:endParaRPr lang="en-AU"/>
           </a:p>
@@ -3544,7 +2956,7 @@
           <a:p>
             <a:fld id="{17E757C0-C851-46AB-BED4-C081D4977DEA}" type="datetimeFigureOut">
               <a:rPr lang="en-AU" smtClean="0"/>
-              <a:t>26/03/2022</a:t>
+              <a:t>27/03/2022</a:t>
             </a:fld>
             <a:endParaRPr lang="en-AU"/>
           </a:p>
@@ -3657,7 +3069,7 @@
           <a:p>
             <a:fld id="{17E757C0-C851-46AB-BED4-C081D4977DEA}" type="datetimeFigureOut">
               <a:rPr lang="en-AU" smtClean="0"/>
-              <a:t>26/03/2022</a:t>
+              <a:t>27/03/2022</a:t>
             </a:fld>
             <a:endParaRPr lang="en-AU"/>
           </a:p>
@@ -3970,7 +3382,7 @@
           <a:p>
             <a:fld id="{17E757C0-C851-46AB-BED4-C081D4977DEA}" type="datetimeFigureOut">
               <a:rPr lang="en-AU" smtClean="0"/>
-              <a:t>26/03/2022</a:t>
+              <a:t>27/03/2022</a:t>
             </a:fld>
             <a:endParaRPr lang="en-AU"/>
           </a:p>
@@ -4259,7 +3671,7 @@
           <a:p>
             <a:fld id="{17E757C0-C851-46AB-BED4-C081D4977DEA}" type="datetimeFigureOut">
               <a:rPr lang="en-AU" smtClean="0"/>
-              <a:t>26/03/2022</a:t>
+              <a:t>27/03/2022</a:t>
             </a:fld>
             <a:endParaRPr lang="en-AU"/>
           </a:p>
@@ -4502,7 +3914,7 @@
           <a:p>
             <a:fld id="{17E757C0-C851-46AB-BED4-C081D4977DEA}" type="datetimeFigureOut">
               <a:rPr lang="en-AU" smtClean="0"/>
-              <a:t>26/03/2022</a:t>
+              <a:t>27/03/2022</a:t>
             </a:fld>
             <a:endParaRPr lang="en-AU"/>
           </a:p>

</xml_diff>